<commit_message>
V0.5 added treemap for collaborations
</commit_message>
<xml_diff>
--- a/myDRE/2023-01-01 - 2023-01-31 myDRE Activity.pptx
+++ b/myDRE/2023-01-01 - 2023-01-31 myDRE Activity.pptx
@@ -13,6 +13,7 @@
     <p:sldId id="258" r:id="rId11"/>
     <p:sldId id="259" r:id="rId12"/>
     <p:sldId id="260" r:id="rId13"/>
+    <p:sldId id="261" r:id="rId14"/>
   </p:sldIdLst>
   <p:sldSz cx="9144000" cy="5143500" type="screen16x9"/>
   <p:notesSz cx="6858000" cy="9144000"/>
@@ -3300,6 +3301,48 @@
           <a:xfrm>
             <a:off x="914400" y="91440"/>
             <a:ext cx="7260336" cy="4800600"/>
+          </a:xfrm>
+          <a:prstGeom prst="rect">
+            <a:avLst/>
+          </a:prstGeom>
+        </p:spPr>
+      </p:pic>
+    </p:spTree>
+  </p:cSld>
+  <p:clrMapOvr>
+    <a:masterClrMapping/>
+  </p:clrMapOvr>
+</p:sld>
+</file>
+
+<file path=ppt/slides/slide6.xml><?xml version="1.0" encoding="utf-8"?>
+<p:sld xmlns:a="http://schemas.openxmlformats.org/drawingml/2006/main" xmlns:p="http://schemas.openxmlformats.org/presentationml/2006/main" xmlns:r="http://schemas.openxmlformats.org/officeDocument/2006/relationships">
+  <p:cSld>
+    <p:spTree>
+      <p:nvGrpSpPr>
+        <p:cNvPr id="1" name=""/>
+        <p:cNvGrpSpPr/>
+        <p:nvPr/>
+      </p:nvGrpSpPr>
+      <p:grpSpPr/>
+      <p:pic>
+        <p:nvPicPr>
+          <p:cNvPr id="2" name="Picture 1" descr="2023-01-01 - 2023-01-31 - Collaboration.png"/>
+          <p:cNvPicPr>
+            <a:picLocks noChangeAspect="1"/>
+          </p:cNvPicPr>
+          <p:nvPr/>
+        </p:nvPicPr>
+        <p:blipFill>
+          <a:blip r:embed="rId2"/>
+          <a:stretch>
+            <a:fillRect/>
+          </a:stretch>
+        </p:blipFill>
+        <p:spPr>
+          <a:xfrm>
+            <a:off x="914400" y="91440"/>
+            <a:ext cx="7620000" cy="5080000"/>
           </a:xfrm>
           <a:prstGeom prst="rect">
             <a:avLst/>

</xml_diff>

<commit_message>
v0.5a make the images larger
</commit_message>
<xml_diff>
--- a/myDRE/2023-01-01 - 2023-01-31 myDRE Activity.pptx
+++ b/myDRE/2023-01-01 - 2023-01-31 myDRE Activity.pptx
@@ -3215,8 +3215,8 @@
         </p:blipFill>
         <p:spPr>
           <a:xfrm>
-            <a:off x="914400" y="91440"/>
-            <a:ext cx="7068312" cy="4800600"/>
+            <a:off x="457200" y="91440"/>
+            <a:ext cx="8229600" cy="5029200"/>
           </a:xfrm>
           <a:prstGeom prst="rect">
             <a:avLst/>
@@ -3257,8 +3257,8 @@
         </p:blipFill>
         <p:spPr>
           <a:xfrm>
-            <a:off x="914400" y="91440"/>
-            <a:ext cx="7333488" cy="4800600"/>
+            <a:off x="457200" y="91440"/>
+            <a:ext cx="8229600" cy="5029200"/>
           </a:xfrm>
           <a:prstGeom prst="rect">
             <a:avLst/>
@@ -3299,8 +3299,8 @@
         </p:blipFill>
         <p:spPr>
           <a:xfrm>
-            <a:off x="914400" y="91440"/>
-            <a:ext cx="7260336" cy="4800600"/>
+            <a:off x="457200" y="91440"/>
+            <a:ext cx="8229600" cy="5029200"/>
           </a:xfrm>
           <a:prstGeom prst="rect">
             <a:avLst/>
@@ -3341,8 +3341,8 @@
         </p:blipFill>
         <p:spPr>
           <a:xfrm>
-            <a:off x="914400" y="91440"/>
-            <a:ext cx="7620000" cy="5080000"/>
+            <a:off x="457200" y="91440"/>
+            <a:ext cx="8229600" cy="5029200"/>
           </a:xfrm>
           <a:prstGeom prst="rect">
             <a:avLst/>

</xml_diff>

<commit_message>
v0.5d add zip functionality per month
</commit_message>
<xml_diff>
--- a/myDRE/2023-01-01 - 2023-01-31 myDRE Activity.pptx
+++ b/myDRE/2023-01-01 - 2023-01-31 myDRE Activity.pptx
@@ -1502,7 +1502,7 @@
         <p:fade thruBlk="1"/>
       </p:transition>
     </mc:Choice>
-    <mc:Fallback xmlns="" xmlns:mv="urn:schemas-microsoft-com:mac:vml" xmlns:c="http://schemas.openxmlformats.org/drawingml/2006/chart" xmlns:dgm="http://schemas.openxmlformats.org/drawingml/2006/diagram" xmlns:o="urn:schemas-microsoft-com:office:office" xmlns:v="urn:schemas-microsoft-com:vml" xmlns:pvml="urn:schemas-microsoft-com:office:powerpoint" xmlns:com="http://schemas.openxmlformats.org/drawingml/2006/compatibility" xmlns:p15="http://schemas.microsoft.com/office/powerpoint/2012/main" xmlns:ahyp="http://schemas.microsoft.com/office/drawing/2018/hyperlinkcolor">
+    <mc:Fallback xmlns:ahyp="http://schemas.microsoft.com/office/drawing/2018/hyperlinkcolor" xmlns:p15="http://schemas.microsoft.com/office/powerpoint/2012/main" xmlns:com="http://schemas.openxmlformats.org/drawingml/2006/compatibility" xmlns:pvml="urn:schemas-microsoft-com:office:powerpoint" xmlns:v="urn:schemas-microsoft-com:vml" xmlns:o="urn:schemas-microsoft-com:office:office" xmlns:dgm="http://schemas.openxmlformats.org/drawingml/2006/diagram" xmlns:c="http://schemas.openxmlformats.org/drawingml/2006/chart" xmlns:mv="urn:schemas-microsoft-com:mac:vml" xmlns="">
       <p:transition spd="slow">
         <p:fade/>
       </p:transition>
@@ -1636,7 +1636,7 @@
         <p:fade thruBlk="1"/>
       </p:transition>
     </mc:Choice>
-    <mc:Fallback xmlns="" xmlns:mv="urn:schemas-microsoft-com:mac:vml" xmlns:c="http://schemas.openxmlformats.org/drawingml/2006/chart" xmlns:dgm="http://schemas.openxmlformats.org/drawingml/2006/diagram" xmlns:o="urn:schemas-microsoft-com:office:office" xmlns:v="urn:schemas-microsoft-com:vml" xmlns:pvml="urn:schemas-microsoft-com:office:powerpoint" xmlns:com="http://schemas.openxmlformats.org/drawingml/2006/compatibility" xmlns:p15="http://schemas.microsoft.com/office/powerpoint/2012/main" xmlns:ahyp="http://schemas.microsoft.com/office/drawing/2018/hyperlinkcolor">
+    <mc:Fallback xmlns:ahyp="http://schemas.microsoft.com/office/drawing/2018/hyperlinkcolor" xmlns:p15="http://schemas.microsoft.com/office/powerpoint/2012/main" xmlns:com="http://schemas.openxmlformats.org/drawingml/2006/compatibility" xmlns:pvml="urn:schemas-microsoft-com:office:powerpoint" xmlns:v="urn:schemas-microsoft-com:vml" xmlns:o="urn:schemas-microsoft-com:office:office" xmlns:dgm="http://schemas.openxmlformats.org/drawingml/2006/diagram" xmlns:c="http://schemas.openxmlformats.org/drawingml/2006/chart" xmlns:mv="urn:schemas-microsoft-com:mac:vml" xmlns="">
       <p:transition spd="slow">
         <p:fade/>
       </p:transition>
@@ -1678,7 +1678,7 @@
         <p:fade thruBlk="1"/>
       </p:transition>
     </mc:Choice>
-    <mc:Fallback xmlns="" xmlns:mv="urn:schemas-microsoft-com:mac:vml" xmlns:c="http://schemas.openxmlformats.org/drawingml/2006/chart" xmlns:dgm="http://schemas.openxmlformats.org/drawingml/2006/diagram" xmlns:o="urn:schemas-microsoft-com:office:office" xmlns:v="urn:schemas-microsoft-com:vml" xmlns:pvml="urn:schemas-microsoft-com:office:powerpoint" xmlns:com="http://schemas.openxmlformats.org/drawingml/2006/compatibility" xmlns:p15="http://schemas.microsoft.com/office/powerpoint/2012/main" xmlns:ahyp="http://schemas.microsoft.com/office/drawing/2018/hyperlinkcolor">
+    <mc:Fallback xmlns:ahyp="http://schemas.microsoft.com/office/drawing/2018/hyperlinkcolor" xmlns:p15="http://schemas.microsoft.com/office/powerpoint/2012/main" xmlns:com="http://schemas.openxmlformats.org/drawingml/2006/compatibility" xmlns:pvml="urn:schemas-microsoft-com:office:powerpoint" xmlns:v="urn:schemas-microsoft-com:vml" xmlns:o="urn:schemas-microsoft-com:office:office" xmlns:dgm="http://schemas.openxmlformats.org/drawingml/2006/diagram" xmlns:c="http://schemas.openxmlformats.org/drawingml/2006/chart" xmlns:mv="urn:schemas-microsoft-com:mac:vml" xmlns="">
       <p:transition spd="slow">
         <p:fade/>
       </p:transition>
@@ -2200,7 +2200,7 @@
         <p:fade thruBlk="1"/>
       </p:transition>
     </mc:Choice>
-    <mc:Fallback xmlns="" xmlns:mv="urn:schemas-microsoft-com:mac:vml" xmlns:c="http://schemas.openxmlformats.org/drawingml/2006/chart" xmlns:dgm="http://schemas.openxmlformats.org/drawingml/2006/diagram" xmlns:o="urn:schemas-microsoft-com:office:office" xmlns:v="urn:schemas-microsoft-com:vml" xmlns:pvml="urn:schemas-microsoft-com:office:powerpoint" xmlns:com="http://schemas.openxmlformats.org/drawingml/2006/compatibility" xmlns:p15="http://schemas.microsoft.com/office/powerpoint/2012/main" xmlns:ahyp="http://schemas.microsoft.com/office/drawing/2018/hyperlinkcolor">
+    <mc:Fallback xmlns:ahyp="http://schemas.microsoft.com/office/drawing/2018/hyperlinkcolor" xmlns:p15="http://schemas.microsoft.com/office/powerpoint/2012/main" xmlns:com="http://schemas.openxmlformats.org/drawingml/2006/compatibility" xmlns:pvml="urn:schemas-microsoft-com:office:powerpoint" xmlns:v="urn:schemas-microsoft-com:vml" xmlns:o="urn:schemas-microsoft-com:office:office" xmlns:dgm="http://schemas.openxmlformats.org/drawingml/2006/diagram" xmlns:c="http://schemas.openxmlformats.org/drawingml/2006/chart" xmlns:mv="urn:schemas-microsoft-com:mac:vml" xmlns="">
       <p:transition spd="slow">
         <p:fade/>
       </p:transition>
@@ -3138,23 +3138,24 @@
                   <a:schemeClr val="accent2"/>
                 </a:solidFill>
               </a:rPr>
-              <a:t>I.</a:t>
+              <a:t>I.e., actual activity can be higher</a:t>
             </a:r>
-            <a:r>
-              <a:rPr lang="en-US">
-                <a:solidFill>
-                  <a:schemeClr val="accent2"/>
-                </a:solidFill>
-              </a:rPr>
-              <a:t>e., </a:t>
-            </a:r>
+          </a:p>
+          <a:p>
+            <a:endParaRPr lang="en-US" dirty="0">
+              <a:solidFill>
+                <a:schemeClr val="accent2"/>
+              </a:solidFill>
+            </a:endParaRPr>
+          </a:p>
+          <a:p>
             <a:r>
               <a:rPr lang="en-US" dirty="0">
                 <a:solidFill>
                   <a:schemeClr val="accent2"/>
                 </a:solidFill>
               </a:rPr>
-              <a:t>actual activity can be higher</a:t>
+              <a:t>In Collaborations, all ‘@mydre.org’ is removed</a:t>
             </a:r>
             <a:endParaRPr lang="LID4096" dirty="0">
               <a:solidFill>
@@ -3180,7 +3181,7 @@
         <p:fade thruBlk="1"/>
       </p:transition>
     </mc:Choice>
-    <mc:Fallback xmlns="" xmlns:mv="urn:schemas-microsoft-com:mac:vml" xmlns:c="http://schemas.openxmlformats.org/drawingml/2006/chart" xmlns:dgm="http://schemas.openxmlformats.org/drawingml/2006/diagram" xmlns:o="urn:schemas-microsoft-com:office:office" xmlns:v="urn:schemas-microsoft-com:vml" xmlns:pvml="urn:schemas-microsoft-com:office:powerpoint" xmlns:com="http://schemas.openxmlformats.org/drawingml/2006/compatibility" xmlns:p15="http://schemas.microsoft.com/office/powerpoint/2012/main" xmlns:ahyp="http://schemas.microsoft.com/office/drawing/2018/hyperlinkcolor">
+    <mc:Fallback xmlns:ahyp="http://schemas.microsoft.com/office/drawing/2018/hyperlinkcolor" xmlns:p15="http://schemas.microsoft.com/office/powerpoint/2012/main" xmlns:com="http://schemas.openxmlformats.org/drawingml/2006/compatibility" xmlns:pvml="urn:schemas-microsoft-com:office:powerpoint" xmlns:v="urn:schemas-microsoft-com:vml" xmlns:o="urn:schemas-microsoft-com:office:office" xmlns:dgm="http://schemas.openxmlformats.org/drawingml/2006/diagram" xmlns:c="http://schemas.openxmlformats.org/drawingml/2006/chart" xmlns:mv="urn:schemas-microsoft-com:mac:vml" xmlns="">
       <p:transition spd="slow">
         <p:fade/>
       </p:transition>

</xml_diff>